<commit_message>
presentacion actualizada - Erasmo
</commit_message>
<xml_diff>
--- a/Proyecto Final Progra.pptx
+++ b/Proyecto Final Progra.pptx
@@ -5,46 +5,47 @@
     <p:sldMasterId id="2147483662" r:id="rId1"/>
   </p:sldMasterIdLst>
   <p:notesMasterIdLst>
-    <p:notesMasterId r:id="rId7"/>
+    <p:notesMasterId r:id="rId8"/>
   </p:notesMasterIdLst>
   <p:sldIdLst>
     <p:sldId id="256" r:id="rId2"/>
     <p:sldId id="257" r:id="rId3"/>
     <p:sldId id="258" r:id="rId4"/>
-    <p:sldId id="260" r:id="rId5"/>
-    <p:sldId id="262" r:id="rId6"/>
+    <p:sldId id="262" r:id="rId5"/>
+    <p:sldId id="260" r:id="rId6"/>
+    <p:sldId id="263" r:id="rId7"/>
   </p:sldIdLst>
   <p:sldSz cx="9144000" cy="5143500" type="screen16x9"/>
   <p:notesSz cx="6858000" cy="9144000"/>
   <p:embeddedFontLst>
     <p:embeddedFont>
-      <p:font typeface="Fira Sans Extra Condensed Medium" panose="020B0603050000020004" pitchFamily="34" charset="0"/>
-      <p:regular r:id="rId8"/>
-      <p:bold r:id="rId9"/>
-      <p:italic r:id="rId10"/>
-      <p:boldItalic r:id="rId11"/>
+      <p:font typeface="Fira Sans Extra Condensed Medium" panose="020B0604020202020204" charset="0"/>
+      <p:regular r:id="rId9"/>
+      <p:bold r:id="rId10"/>
+      <p:italic r:id="rId11"/>
+      <p:boldItalic r:id="rId12"/>
     </p:embeddedFont>
     <p:embeddedFont>
-      <p:font typeface="Lato" panose="020F0502020204030204" pitchFamily="34" charset="0"/>
-      <p:regular r:id="rId12"/>
-      <p:bold r:id="rId13"/>
-      <p:italic r:id="rId14"/>
-      <p:boldItalic r:id="rId15"/>
+      <p:font typeface="Lato" panose="020F0502020204030203" pitchFamily="34" charset="0"/>
+      <p:regular r:id="rId13"/>
+      <p:bold r:id="rId14"/>
+      <p:italic r:id="rId15"/>
+      <p:boldItalic r:id="rId16"/>
     </p:embeddedFont>
     <p:embeddedFont>
-      <p:font typeface="Lato Light" panose="020F0302020204030203" pitchFamily="34" charset="77"/>
-      <p:regular r:id="rId16"/>
-      <p:bold r:id="rId17"/>
-      <p:italic r:id="rId18"/>
-      <p:boldItalic r:id="rId19"/>
+      <p:font typeface="Lato Light" panose="020B0604020202020204" charset="0"/>
+      <p:regular r:id="rId17"/>
+      <p:bold r:id="rId18"/>
+      <p:italic r:id="rId19"/>
+      <p:boldItalic r:id="rId20"/>
     </p:embeddedFont>
     <p:embeddedFont>
-      <p:font typeface="Squada One" panose="02000000000000000000" pitchFamily="2" charset="0"/>
-      <p:regular r:id="rId20"/>
+      <p:font typeface="Squada One" panose="020B0604020202020204" charset="0"/>
+      <p:regular r:id="rId21"/>
     </p:embeddedFont>
     <p:embeddedFont>
-      <p:font typeface="Unica One" panose="02000506000000020004" pitchFamily="2" charset="77"/>
-      <p:regular r:id="rId21"/>
+      <p:font typeface="Unica One" panose="020B0604020202020204" charset="0"/>
+      <p:regular r:id="rId22"/>
     </p:embeddedFont>
   </p:embeddedFontLst>
   <p:defaultTextStyle>
@@ -1042,6 +1043,110 @@
   <p:cSld>
     <p:spTree>
       <p:nvGrpSpPr>
+        <p:cNvPr id="1" name="Shape 75"/>
+        <p:cNvGrpSpPr/>
+        <p:nvPr/>
+      </p:nvGrpSpPr>
+      <p:grpSpPr>
+        <a:xfrm>
+          <a:off x="0" y="0"/>
+          <a:ext cx="0" cy="0"/>
+          <a:chOff x="0" y="0"/>
+          <a:chExt cx="0" cy="0"/>
+        </a:xfrm>
+      </p:grpSpPr>
+      <p:sp>
+        <p:nvSpPr>
+          <p:cNvPr id="76" name="Google Shape;76;g5c855921c3_1_430:notes"/>
+          <p:cNvSpPr>
+            <a:spLocks noGrp="1" noRot="1" noChangeAspect="1"/>
+          </p:cNvSpPr>
+          <p:nvPr>
+            <p:ph type="sldImg" idx="2"/>
+          </p:nvPr>
+        </p:nvSpPr>
+        <p:spPr>
+          <a:xfrm>
+            <a:off x="381000" y="685800"/>
+            <a:ext cx="6096000" cy="3429000"/>
+          </a:xfrm>
+          <a:custGeom>
+            <a:avLst/>
+            <a:gdLst/>
+            <a:ahLst/>
+            <a:cxnLst/>
+            <a:rect l="l" t="t" r="r" b="b"/>
+            <a:pathLst>
+              <a:path w="120000" h="120000" extrusionOk="0">
+                <a:moveTo>
+                  <a:pt x="0" y="0"/>
+                </a:moveTo>
+                <a:lnTo>
+                  <a:pt x="120000" y="0"/>
+                </a:lnTo>
+                <a:lnTo>
+                  <a:pt x="120000" y="120000"/>
+                </a:lnTo>
+                <a:lnTo>
+                  <a:pt x="0" y="120000"/>
+                </a:lnTo>
+                <a:close/>
+              </a:path>
+            </a:pathLst>
+          </a:custGeom>
+        </p:spPr>
+      </p:sp>
+      <p:sp>
+        <p:nvSpPr>
+          <p:cNvPr id="77" name="Google Shape;77;g5c855921c3_1_430:notes"/>
+          <p:cNvSpPr txBox="1">
+            <a:spLocks noGrp="1"/>
+          </p:cNvSpPr>
+          <p:nvPr>
+            <p:ph type="body" idx="1"/>
+          </p:nvPr>
+        </p:nvSpPr>
+        <p:spPr>
+          <a:xfrm>
+            <a:off x="685800" y="4343400"/>
+            <a:ext cx="5486400" cy="4114800"/>
+          </a:xfrm>
+          <a:prstGeom prst="rect">
+            <a:avLst/>
+          </a:prstGeom>
+        </p:spPr>
+        <p:txBody>
+          <a:bodyPr spcFirstLastPara="1" wrap="square" lIns="91425" tIns="91425" rIns="91425" bIns="91425" anchor="t" anchorCtr="0">
+            <a:noAutofit/>
+          </a:bodyPr>
+          <a:lstStyle/>
+          <a:p>
+            <a:pPr marL="0" lvl="0" indent="0" algn="l" rtl="0">
+              <a:spcBef>
+                <a:spcPts val="0"/>
+              </a:spcBef>
+              <a:spcAft>
+                <a:spcPts val="0"/>
+              </a:spcAft>
+              <a:buNone/>
+            </a:pPr>
+            <a:endParaRPr/>
+          </a:p>
+        </p:txBody>
+      </p:sp>
+    </p:spTree>
+  </p:cSld>
+  <p:clrMapOvr>
+    <a:masterClrMapping/>
+  </p:clrMapOvr>
+</p:notes>
+</file>
+
+<file path=ppt/notesSlides/notesSlide5.xml><?xml version="1.0" encoding="utf-8"?>
+<p:notes xmlns:a="http://schemas.openxmlformats.org/drawingml/2006/main" xmlns:r="http://schemas.openxmlformats.org/officeDocument/2006/relationships" xmlns:p="http://schemas.openxmlformats.org/presentationml/2006/main" showMasterSp="0" showMasterPhAnim="0">
+  <p:cSld>
+    <p:spTree>
+      <p:nvGrpSpPr>
         <p:cNvPr id="1" name="Shape 182"/>
         <p:cNvGrpSpPr/>
         <p:nvPr/>
@@ -1141,12 +1246,12 @@
 </p:notes>
 </file>
 
-<file path=ppt/notesSlides/notesSlide5.xml><?xml version="1.0" encoding="utf-8"?>
+<file path=ppt/notesSlides/notesSlide6.xml><?xml version="1.0" encoding="utf-8"?>
 <p:notes xmlns:a="http://schemas.openxmlformats.org/drawingml/2006/main" xmlns:r="http://schemas.openxmlformats.org/officeDocument/2006/relationships" xmlns:p="http://schemas.openxmlformats.org/presentationml/2006/main" showMasterSp="0" showMasterPhAnim="0">
   <p:cSld>
     <p:spTree>
       <p:nvGrpSpPr>
-        <p:cNvPr id="1" name="Shape 75"/>
+        <p:cNvPr id="1" name="Shape 192"/>
         <p:cNvGrpSpPr/>
         <p:nvPr/>
       </p:nvGrpSpPr>
@@ -1160,7 +1265,7 @@
       </p:grpSpPr>
       <p:sp>
         <p:nvSpPr>
-          <p:cNvPr id="76" name="Google Shape;76;g5c855921c3_1_430:notes"/>
+          <p:cNvPr id="193" name="Google Shape;193;g5c3a6013ac_3_61:notes"/>
           <p:cNvSpPr>
             <a:spLocks noGrp="1" noRot="1" noChangeAspect="1"/>
           </p:cNvSpPr>
@@ -1201,7 +1306,7 @@
       </p:sp>
       <p:sp>
         <p:nvSpPr>
-          <p:cNvPr id="77" name="Google Shape;77;g5c855921c3_1_430:notes"/>
+          <p:cNvPr id="194" name="Google Shape;194;g5c3a6013ac_3_61:notes"/>
           <p:cNvSpPr txBox="1">
             <a:spLocks noGrp="1"/>
           </p:cNvSpPr>
@@ -14899,6 +15004,402 @@
   <p:cSld>
     <p:spTree>
       <p:nvGrpSpPr>
+        <p:cNvPr id="1" name="Shape 78"/>
+        <p:cNvGrpSpPr/>
+        <p:nvPr/>
+      </p:nvGrpSpPr>
+      <p:grpSpPr>
+        <a:xfrm>
+          <a:off x="0" y="0"/>
+          <a:ext cx="0" cy="0"/>
+          <a:chOff x="0" y="0"/>
+          <a:chExt cx="0" cy="0"/>
+        </a:xfrm>
+      </p:grpSpPr>
+      <p:cxnSp>
+        <p:nvCxnSpPr>
+          <p:cNvPr id="79" name="Google Shape;79;p15"/>
+          <p:cNvCxnSpPr/>
+          <p:nvPr/>
+        </p:nvCxnSpPr>
+        <p:spPr>
+          <a:xfrm>
+            <a:off x="2609850" y="3905250"/>
+            <a:ext cx="4695900" cy="0"/>
+          </a:xfrm>
+          <a:prstGeom prst="straightConnector1">
+            <a:avLst/>
+          </a:prstGeom>
+          <a:noFill/>
+          <a:ln w="9525" cap="flat" cmpd="sng">
+            <a:solidFill>
+              <a:schemeClr val="lt1"/>
+            </a:solidFill>
+            <a:prstDash val="solid"/>
+            <a:round/>
+            <a:headEnd type="none" w="med" len="med"/>
+            <a:tailEnd type="none" w="med" len="med"/>
+          </a:ln>
+        </p:spPr>
+      </p:cxnSp>
+      <p:sp>
+        <p:nvSpPr>
+          <p:cNvPr id="80" name="Google Shape;80;p15"/>
+          <p:cNvSpPr txBox="1">
+            <a:spLocks noGrp="1"/>
+          </p:cNvSpPr>
+          <p:nvPr>
+            <p:ph type="ctrTitle"/>
+          </p:nvPr>
+        </p:nvSpPr>
+        <p:spPr>
+          <a:xfrm>
+            <a:off x="2152650" y="384025"/>
+            <a:ext cx="2806800" cy="477000"/>
+          </a:xfrm>
+          <a:prstGeom prst="rect">
+            <a:avLst/>
+          </a:prstGeom>
+        </p:spPr>
+        <p:txBody>
+          <a:bodyPr spcFirstLastPara="1" wrap="square" lIns="91425" tIns="91425" rIns="91425" bIns="91425" anchor="ctr" anchorCtr="0">
+            <a:noAutofit/>
+          </a:bodyPr>
+          <a:lstStyle/>
+          <a:p>
+            <a:pPr marL="0" lvl="0" indent="0" algn="l" rtl="0">
+              <a:spcBef>
+                <a:spcPts val="0"/>
+              </a:spcBef>
+              <a:spcAft>
+                <a:spcPts val="0"/>
+              </a:spcAft>
+              <a:buNone/>
+            </a:pPr>
+            <a:r>
+              <a:rPr lang="es"/>
+              <a:t>Sensores</a:t>
+            </a:r>
+            <a:endParaRPr/>
+          </a:p>
+        </p:txBody>
+      </p:sp>
+      <p:sp>
+        <p:nvSpPr>
+          <p:cNvPr id="81" name="Google Shape;81;p15"/>
+          <p:cNvSpPr txBox="1">
+            <a:spLocks noGrp="1"/>
+          </p:cNvSpPr>
+          <p:nvPr>
+            <p:ph type="subTitle" idx="1"/>
+          </p:nvPr>
+        </p:nvSpPr>
+        <p:spPr>
+          <a:xfrm>
+            <a:off x="2453225" y="2958250"/>
+            <a:ext cx="4416000" cy="1166100"/>
+          </a:xfrm>
+          <a:prstGeom prst="rect">
+            <a:avLst/>
+          </a:prstGeom>
+        </p:spPr>
+        <p:txBody>
+          <a:bodyPr spcFirstLastPara="1" wrap="square" lIns="91425" tIns="91425" rIns="91425" bIns="91425" anchor="t" anchorCtr="0">
+            <a:noAutofit/>
+          </a:bodyPr>
+          <a:lstStyle/>
+          <a:p>
+            <a:pPr marL="0" lvl="0" indent="0" algn="l" rtl="0">
+              <a:spcBef>
+                <a:spcPts val="0"/>
+              </a:spcBef>
+              <a:spcAft>
+                <a:spcPts val="0"/>
+              </a:spcAft>
+              <a:buClr>
+                <a:schemeClr val="dk1"/>
+              </a:buClr>
+              <a:buSzPts val="1100"/>
+              <a:buFont typeface="Arial"/>
+              <a:buNone/>
+            </a:pPr>
+            <a:r>
+              <a:rPr lang="es"/>
+              <a:t>Se requiere instalar software que conecte los datos de los sensores a una interfaz amigable al usuario. Puede ser desde una app celular o un indicador en la pantalla de un automóvil, o una notificación de correo. </a:t>
+            </a:r>
+            <a:endParaRPr/>
+          </a:p>
+        </p:txBody>
+      </p:sp>
+      <p:pic>
+        <p:nvPicPr>
+          <p:cNvPr id="82" name="Google Shape;82;p15"/>
+          <p:cNvPicPr preferRelativeResize="0"/>
+          <p:nvPr/>
+        </p:nvPicPr>
+        <p:blipFill>
+          <a:blip r:embed="rId3">
+            <a:alphaModFix/>
+          </a:blip>
+          <a:stretch>
+            <a:fillRect/>
+          </a:stretch>
+        </p:blipFill>
+        <p:spPr>
+          <a:xfrm>
+            <a:off x="6632838" y="1857375"/>
+            <a:ext cx="3720837" cy="3879550"/>
+          </a:xfrm>
+          <a:prstGeom prst="rect">
+            <a:avLst/>
+          </a:prstGeom>
+          <a:noFill/>
+          <a:ln>
+            <a:noFill/>
+          </a:ln>
+        </p:spPr>
+      </p:pic>
+      <p:sp>
+        <p:nvSpPr>
+          <p:cNvPr id="83" name="Google Shape;83;p15"/>
+          <p:cNvSpPr txBox="1">
+            <a:spLocks noGrp="1"/>
+          </p:cNvSpPr>
+          <p:nvPr>
+            <p:ph type="ctrTitle"/>
+          </p:nvPr>
+        </p:nvSpPr>
+        <p:spPr>
+          <a:xfrm>
+            <a:off x="-65400" y="370850"/>
+            <a:ext cx="2013600" cy="946200"/>
+          </a:xfrm>
+          <a:prstGeom prst="rect">
+            <a:avLst/>
+          </a:prstGeom>
+        </p:spPr>
+        <p:txBody>
+          <a:bodyPr spcFirstLastPara="1" wrap="square" lIns="91425" tIns="91425" rIns="91425" bIns="91425" anchor="ctr" anchorCtr="0">
+            <a:noAutofit/>
+          </a:bodyPr>
+          <a:lstStyle/>
+          <a:p>
+            <a:pPr marL="0" lvl="0" indent="0" algn="l" rtl="0">
+              <a:spcBef>
+                <a:spcPts val="0"/>
+              </a:spcBef>
+              <a:spcAft>
+                <a:spcPts val="0"/>
+              </a:spcAft>
+              <a:buNone/>
+            </a:pPr>
+            <a:r>
+              <a:rPr lang="es" sz="1700"/>
+              <a:t>¿Cómo lo harías?</a:t>
+            </a:r>
+            <a:endParaRPr sz="1700"/>
+          </a:p>
+        </p:txBody>
+      </p:sp>
+      <p:sp>
+        <p:nvSpPr>
+          <p:cNvPr id="84" name="Google Shape;84;p15"/>
+          <p:cNvSpPr txBox="1">
+            <a:spLocks noGrp="1"/>
+          </p:cNvSpPr>
+          <p:nvPr>
+            <p:ph type="ctrTitle"/>
+          </p:nvPr>
+        </p:nvSpPr>
+        <p:spPr>
+          <a:xfrm>
+            <a:off x="2228850" y="2678025"/>
+            <a:ext cx="2806800" cy="477000"/>
+          </a:xfrm>
+          <a:prstGeom prst="rect">
+            <a:avLst/>
+          </a:prstGeom>
+        </p:spPr>
+        <p:txBody>
+          <a:bodyPr spcFirstLastPara="1" wrap="square" lIns="91425" tIns="91425" rIns="91425" bIns="91425" anchor="ctr" anchorCtr="0">
+            <a:noAutofit/>
+          </a:bodyPr>
+          <a:lstStyle/>
+          <a:p>
+            <a:pPr marL="0" lvl="0" indent="0" algn="l" rtl="0">
+              <a:spcBef>
+                <a:spcPts val="0"/>
+              </a:spcBef>
+              <a:spcAft>
+                <a:spcPts val="0"/>
+              </a:spcAft>
+              <a:buNone/>
+            </a:pPr>
+            <a:r>
+              <a:rPr lang="es"/>
+              <a:t>Dispositivos</a:t>
+            </a:r>
+            <a:endParaRPr/>
+          </a:p>
+        </p:txBody>
+      </p:sp>
+      <p:sp>
+        <p:nvSpPr>
+          <p:cNvPr id="85" name="Google Shape;85;p15"/>
+          <p:cNvSpPr txBox="1">
+            <a:spLocks noGrp="1"/>
+          </p:cNvSpPr>
+          <p:nvPr>
+            <p:ph type="subTitle" idx="1"/>
+          </p:nvPr>
+        </p:nvSpPr>
+        <p:spPr>
+          <a:xfrm>
+            <a:off x="2381250" y="698750"/>
+            <a:ext cx="5116200" cy="1525500"/>
+          </a:xfrm>
+          <a:prstGeom prst="rect">
+            <a:avLst/>
+          </a:prstGeom>
+        </p:spPr>
+        <p:txBody>
+          <a:bodyPr spcFirstLastPara="1" wrap="square" lIns="91425" tIns="91425" rIns="91425" bIns="91425" anchor="t" anchorCtr="0">
+            <a:noAutofit/>
+          </a:bodyPr>
+          <a:lstStyle/>
+          <a:p>
+            <a:pPr marL="0" lvl="0" indent="0" algn="l" rtl="0">
+              <a:spcBef>
+                <a:spcPts val="0"/>
+              </a:spcBef>
+              <a:spcAft>
+                <a:spcPts val="0"/>
+              </a:spcAft>
+              <a:buClr>
+                <a:schemeClr val="dk1"/>
+              </a:buClr>
+              <a:buSzPts val="1100"/>
+              <a:buFont typeface="Arial"/>
+              <a:buNone/>
+            </a:pPr>
+            <a:r>
+              <a:rPr lang="es"/>
+              <a:t>Se requieren de sensores instalados en los edificios altos, alcantarillas, avionetas,  ríos, tierra de cultivo y cualquier punto clave en la ciudad/campo para una medición adecuada. Para medir la contaminación en ámbitos distintos ambientales de la ciudad se requieren sensores de detección de:</a:t>
+            </a:r>
+            <a:endParaRPr/>
+          </a:p>
+          <a:p>
+            <a:pPr marL="0" lvl="0" indent="0" algn="l" rtl="0">
+              <a:spcBef>
+                <a:spcPts val="0"/>
+              </a:spcBef>
+              <a:spcAft>
+                <a:spcPts val="0"/>
+              </a:spcAft>
+              <a:buClr>
+                <a:schemeClr val="dk1"/>
+              </a:buClr>
+              <a:buSzPts val="1100"/>
+              <a:buFont typeface="Arial"/>
+              <a:buNone/>
+            </a:pPr>
+            <a:endParaRPr/>
+          </a:p>
+          <a:p>
+            <a:pPr marL="457200" lvl="0" indent="-304800" algn="l" rtl="0">
+              <a:spcBef>
+                <a:spcPts val="0"/>
+              </a:spcBef>
+              <a:spcAft>
+                <a:spcPts val="0"/>
+              </a:spcAft>
+              <a:buSzPts val="1200"/>
+              <a:buChar char="●"/>
+            </a:pPr>
+            <a:r>
+              <a:rPr lang="es"/>
+              <a:t>CO2, N2O, CH4, entre otros gases de efecto invernadero, para la contaminación atmosférica del aire.</a:t>
+            </a:r>
+            <a:endParaRPr/>
+          </a:p>
+          <a:p>
+            <a:pPr marL="457200" lvl="0" indent="-304800" algn="l" rtl="0">
+              <a:spcBef>
+                <a:spcPts val="0"/>
+              </a:spcBef>
+              <a:spcAft>
+                <a:spcPts val="0"/>
+              </a:spcAft>
+              <a:buSzPts val="1200"/>
+              <a:buChar char="●"/>
+            </a:pPr>
+            <a:r>
+              <a:rPr lang="es"/>
+              <a:t>Materia orgánica descompuesta (basura), microorganismos dañinos o ácidos fuertes para el agua.</a:t>
+            </a:r>
+            <a:endParaRPr/>
+          </a:p>
+          <a:p>
+            <a:pPr marL="457200" lvl="0" indent="-304800" algn="l" rtl="0">
+              <a:spcBef>
+                <a:spcPts val="0"/>
+              </a:spcBef>
+              <a:spcAft>
+                <a:spcPts val="0"/>
+              </a:spcAft>
+              <a:buSzPts val="1200"/>
+              <a:buChar char="●"/>
+            </a:pPr>
+            <a:r>
+              <a:rPr lang="es"/>
+              <a:t>N2, K, P2O5, y orgánicos tóxicos en la tierra de cultivo. </a:t>
+            </a:r>
+            <a:endParaRPr/>
+          </a:p>
+          <a:p>
+            <a:pPr marL="0" lvl="0" indent="0" algn="l" rtl="0">
+              <a:spcBef>
+                <a:spcPts val="0"/>
+              </a:spcBef>
+              <a:spcAft>
+                <a:spcPts val="0"/>
+              </a:spcAft>
+              <a:buClr>
+                <a:schemeClr val="dk1"/>
+              </a:buClr>
+              <a:buSzPts val="1100"/>
+              <a:buFont typeface="Arial"/>
+              <a:buNone/>
+            </a:pPr>
+            <a:endParaRPr/>
+          </a:p>
+          <a:p>
+            <a:pPr marL="0" lvl="0" indent="0" algn="l" rtl="0">
+              <a:spcBef>
+                <a:spcPts val="0"/>
+              </a:spcBef>
+              <a:spcAft>
+                <a:spcPts val="0"/>
+              </a:spcAft>
+              <a:buNone/>
+            </a:pPr>
+            <a:endParaRPr/>
+          </a:p>
+        </p:txBody>
+      </p:sp>
+    </p:spTree>
+  </p:cSld>
+  <p:clrMapOvr>
+    <a:masterClrMapping/>
+  </p:clrMapOvr>
+</p:sld>
+</file>
+
+<file path=ppt/slides/slide5.xml><?xml version="1.0" encoding="utf-8"?>
+<p:sld xmlns:a="http://schemas.openxmlformats.org/drawingml/2006/main" xmlns:r="http://schemas.openxmlformats.org/officeDocument/2006/relationships" xmlns:p="http://schemas.openxmlformats.org/presentationml/2006/main">
+  <p:cSld>
+    <p:spTree>
+      <p:nvGrpSpPr>
         <p:cNvPr id="1" name="Shape 185"/>
         <p:cNvGrpSpPr/>
         <p:nvPr/>
@@ -15506,12 +16007,12 @@
 </p:sld>
 </file>
 
-<file path=ppt/slides/slide5.xml><?xml version="1.0" encoding="utf-8"?>
+<file path=ppt/slides/slide6.xml><?xml version="1.0" encoding="utf-8"?>
 <p:sld xmlns:a="http://schemas.openxmlformats.org/drawingml/2006/main" xmlns:r="http://schemas.openxmlformats.org/officeDocument/2006/relationships" xmlns:p="http://schemas.openxmlformats.org/presentationml/2006/main">
   <p:cSld>
     <p:spTree>
       <p:nvGrpSpPr>
-        <p:cNvPr id="1" name="Shape 78"/>
+        <p:cNvPr id="1" name="Shape 195"/>
         <p:cNvGrpSpPr/>
         <p:nvPr/>
       </p:nvGrpSpPr>
@@ -15525,14 +16026,118 @@
       </p:grpSpPr>
       <p:cxnSp>
         <p:nvCxnSpPr>
-          <p:cNvPr id="79" name="Google Shape;79;p15"/>
+          <p:cNvPr id="196" name="Google Shape;196;p20"/>
           <p:cNvCxnSpPr/>
           <p:nvPr/>
         </p:nvCxnSpPr>
         <p:spPr>
-          <a:xfrm>
-            <a:off x="2609850" y="3905250"/>
-            <a:ext cx="4695900" cy="0"/>
+          <a:xfrm rot="10800000">
+            <a:off x="5280938" y="4086330"/>
+            <a:ext cx="1613100" cy="0"/>
+          </a:xfrm>
+          <a:prstGeom prst="straightConnector1">
+            <a:avLst/>
+          </a:prstGeom>
+          <a:noFill/>
+          <a:ln w="9525" cap="flat" cmpd="sng">
+            <a:solidFill>
+              <a:schemeClr val="lt1"/>
+            </a:solidFill>
+            <a:prstDash val="solid"/>
+            <a:round/>
+            <a:headEnd type="none" w="med" len="med"/>
+            <a:tailEnd type="none" w="med" len="med"/>
+          </a:ln>
+        </p:spPr>
+      </p:cxnSp>
+      <p:cxnSp>
+        <p:nvCxnSpPr>
+          <p:cNvPr id="197" name="Google Shape;197;p20"/>
+          <p:cNvCxnSpPr/>
+          <p:nvPr/>
+        </p:nvCxnSpPr>
+        <p:spPr>
+          <a:xfrm rot="10800000">
+            <a:off x="2451987" y="1934126"/>
+            <a:ext cx="1613100" cy="0"/>
+          </a:xfrm>
+          <a:prstGeom prst="straightConnector1">
+            <a:avLst/>
+          </a:prstGeom>
+          <a:noFill/>
+          <a:ln w="9525" cap="flat" cmpd="sng">
+            <a:solidFill>
+              <a:schemeClr val="lt1"/>
+            </a:solidFill>
+            <a:prstDash val="solid"/>
+            <a:round/>
+            <a:headEnd type="none" w="med" len="med"/>
+            <a:tailEnd type="none" w="med" len="med"/>
+          </a:ln>
+        </p:spPr>
+      </p:cxnSp>
+      <p:cxnSp>
+        <p:nvCxnSpPr>
+          <p:cNvPr id="198" name="Google Shape;198;p20"/>
+          <p:cNvCxnSpPr/>
+          <p:nvPr/>
+        </p:nvCxnSpPr>
+        <p:spPr>
+          <a:xfrm rot="10800000">
+            <a:off x="5183713" y="2639859"/>
+            <a:ext cx="1613100" cy="0"/>
+          </a:xfrm>
+          <a:prstGeom prst="straightConnector1">
+            <a:avLst/>
+          </a:prstGeom>
+          <a:noFill/>
+          <a:ln w="9525" cap="flat" cmpd="sng">
+            <a:solidFill>
+              <a:schemeClr val="lt1"/>
+            </a:solidFill>
+            <a:prstDash val="solid"/>
+            <a:round/>
+            <a:headEnd type="none" w="med" len="med"/>
+            <a:tailEnd type="none" w="med" len="med"/>
+          </a:ln>
+        </p:spPr>
+      </p:cxnSp>
+      <p:cxnSp>
+        <p:nvCxnSpPr>
+          <p:cNvPr id="199" name="Google Shape;199;p20"/>
+          <p:cNvCxnSpPr/>
+          <p:nvPr/>
+        </p:nvCxnSpPr>
+        <p:spPr>
+          <a:xfrm rot="10800000">
+            <a:off x="2451987" y="3325177"/>
+            <a:ext cx="1613100" cy="0"/>
+          </a:xfrm>
+          <a:prstGeom prst="straightConnector1">
+            <a:avLst/>
+          </a:prstGeom>
+          <a:noFill/>
+          <a:ln w="9525" cap="flat" cmpd="sng">
+            <a:solidFill>
+              <a:schemeClr val="lt1"/>
+            </a:solidFill>
+            <a:prstDash val="solid"/>
+            <a:round/>
+            <a:headEnd type="none" w="med" len="med"/>
+            <a:tailEnd type="none" w="med" len="med"/>
+          </a:ln>
+        </p:spPr>
+      </p:cxnSp>
+      <p:cxnSp>
+        <p:nvCxnSpPr>
+          <p:cNvPr id="200" name="Google Shape;200;p20"/>
+          <p:cNvCxnSpPr/>
+          <p:nvPr/>
+        </p:nvCxnSpPr>
+        <p:spPr>
+          <a:xfrm rot="10800000">
+            <a:off x="5298488" y="1131863"/>
+            <a:ext cx="1613100" cy="0"/>
           </a:xfrm>
           <a:prstGeom prst="straightConnector1">
             <a:avLst/>
@@ -15551,60 +16156,177 @@
       </p:cxnSp>
       <p:sp>
         <p:nvSpPr>
-          <p:cNvPr id="80" name="Google Shape;80;p15"/>
+          <p:cNvPr id="201" name="Google Shape;201;p20"/>
           <p:cNvSpPr txBox="1">
             <a:spLocks noGrp="1"/>
           </p:cNvSpPr>
           <p:nvPr>
-            <p:ph type="ctrTitle"/>
+            <p:ph type="subTitle" idx="4294967295"/>
           </p:nvPr>
         </p:nvSpPr>
         <p:spPr>
           <a:xfrm>
-            <a:off x="2152650" y="384025"/>
-            <a:ext cx="2806800" cy="477000"/>
+            <a:off x="1270850" y="3325175"/>
+            <a:ext cx="2525700" cy="572400"/>
           </a:xfrm>
           <a:prstGeom prst="rect">
             <a:avLst/>
           </a:prstGeom>
         </p:spPr>
         <p:txBody>
-          <a:bodyPr spcFirstLastPara="1" wrap="square" lIns="91425" tIns="91425" rIns="91425" bIns="91425" anchor="ctr" anchorCtr="0">
+          <a:bodyPr spcFirstLastPara="1" wrap="square" lIns="91425" tIns="91425" rIns="91425" bIns="91425" anchor="t" anchorCtr="0">
             <a:noAutofit/>
           </a:bodyPr>
           <a:lstStyle/>
           <a:p>
-            <a:pPr marL="0" lvl="0" indent="0" algn="l" rtl="0">
-              <a:spcBef>
-                <a:spcPts val="0"/>
-              </a:spcBef>
-              <a:spcAft>
-                <a:spcPts val="0"/>
-              </a:spcAft>
+            <a:pPr marL="0" lvl="0" indent="0" algn="just" rtl="0">
+              <a:lnSpc>
+                <a:spcPct val="100000"/>
+              </a:lnSpc>
+              <a:spcBef>
+                <a:spcPts val="0"/>
+              </a:spcBef>
+              <a:spcAft>
+                <a:spcPts val="0"/>
+              </a:spcAft>
+              <a:buClr>
+                <a:schemeClr val="dk1"/>
+              </a:buClr>
+              <a:buSzPts val="1100"/>
+              <a:buFont typeface="Arial"/>
               <a:buNone/>
             </a:pPr>
             <a:r>
-              <a:rPr lang="es"/>
-              <a:t>Sensores</a:t>
+              <a:rPr lang="es" sz="1300">
+                <a:latin typeface="Lato"/>
+                <a:ea typeface="Lato"/>
+                <a:cs typeface="Lato"/>
+                <a:sym typeface="Lato"/>
+              </a:rPr>
+              <a:t>p</a:t>
             </a:r>
-            <a:endParaRPr/>
+            <a:r>
+              <a:rPr lang="es" sz="900">
+                <a:latin typeface="Lato"/>
+                <a:ea typeface="Lato"/>
+                <a:cs typeface="Lato"/>
+                <a:sym typeface="Lato"/>
+              </a:rPr>
+              <a:t>resenta la calidad del aire de manera visual, tiene datos de más de 10,000 ciudades.</a:t>
+            </a:r>
+            <a:endParaRPr sz="900">
+              <a:latin typeface="Lato"/>
+              <a:ea typeface="Lato"/>
+              <a:cs typeface="Lato"/>
+              <a:sym typeface="Lato"/>
+            </a:endParaRPr>
+          </a:p>
+          <a:p>
+            <a:pPr marL="0" lvl="0" indent="0" algn="just" rtl="0">
+              <a:lnSpc>
+                <a:spcPct val="100000"/>
+              </a:lnSpc>
+              <a:spcBef>
+                <a:spcPts val="0"/>
+              </a:spcBef>
+              <a:spcAft>
+                <a:spcPts val="0"/>
+              </a:spcAft>
+              <a:buClr>
+                <a:schemeClr val="dk1"/>
+              </a:buClr>
+              <a:buSzPts val="1100"/>
+              <a:buFont typeface="Arial"/>
+              <a:buNone/>
+            </a:pPr>
+            <a:endParaRPr sz="900"/>
           </a:p>
         </p:txBody>
       </p:sp>
       <p:sp>
         <p:nvSpPr>
-          <p:cNvPr id="81" name="Google Shape;81;p15"/>
+          <p:cNvPr id="202" name="Google Shape;202;p20"/>
           <p:cNvSpPr txBox="1">
             <a:spLocks noGrp="1"/>
           </p:cNvSpPr>
           <p:nvPr>
-            <p:ph type="subTitle" idx="1"/>
+            <p:ph type="subTitle" idx="4294967295"/>
           </p:nvPr>
         </p:nvSpPr>
         <p:spPr>
           <a:xfrm>
-            <a:off x="2453225" y="2958250"/>
-            <a:ext cx="4416000" cy="1166100"/>
+            <a:off x="4611450" y="2620550"/>
+            <a:ext cx="3642900" cy="397500"/>
+          </a:xfrm>
+          <a:prstGeom prst="rect">
+            <a:avLst/>
+          </a:prstGeom>
+        </p:spPr>
+        <p:txBody>
+          <a:bodyPr spcFirstLastPara="1" wrap="square" lIns="91425" tIns="91425" rIns="91425" bIns="91425" anchor="t" anchorCtr="0">
+            <a:noAutofit/>
+          </a:bodyPr>
+          <a:lstStyle/>
+          <a:p>
+            <a:pPr marL="914400" lvl="0" indent="0" algn="l" rtl="0">
+              <a:lnSpc>
+                <a:spcPct val="100000"/>
+              </a:lnSpc>
+              <a:spcBef>
+                <a:spcPts val="0"/>
+              </a:spcBef>
+              <a:spcAft>
+                <a:spcPts val="0"/>
+              </a:spcAft>
+              <a:buNone/>
+            </a:pPr>
+            <a:r>
+              <a:rPr lang="es" sz="900">
+                <a:latin typeface="Lato"/>
+                <a:ea typeface="Lato"/>
+                <a:cs typeface="Lato"/>
+                <a:sym typeface="Lato"/>
+              </a:rPr>
+              <a:t>Muestra la exposición en tiempo real de diferentes contaminante en diferentes lugares, ofreciendo la posibilidad de compartir datos por redes sociales, para notificar a las personas del estado ambiental </a:t>
+            </a:r>
+            <a:endParaRPr sz="900">
+              <a:latin typeface="Lato"/>
+              <a:ea typeface="Lato"/>
+              <a:cs typeface="Lato"/>
+              <a:sym typeface="Lato"/>
+            </a:endParaRPr>
+          </a:p>
+          <a:p>
+            <a:pPr marL="0" lvl="0" indent="0" algn="l" rtl="0">
+              <a:lnSpc>
+                <a:spcPct val="100000"/>
+              </a:lnSpc>
+              <a:spcBef>
+                <a:spcPts val="0"/>
+              </a:spcBef>
+              <a:spcAft>
+                <a:spcPts val="1600"/>
+              </a:spcAft>
+              <a:buNone/>
+            </a:pPr>
+            <a:endParaRPr sz="900"/>
+          </a:p>
+        </p:txBody>
+      </p:sp>
+      <p:sp>
+        <p:nvSpPr>
+          <p:cNvPr id="203" name="Google Shape;203;p20"/>
+          <p:cNvSpPr txBox="1">
+            <a:spLocks noGrp="1"/>
+          </p:cNvSpPr>
+          <p:nvPr>
+            <p:ph type="subTitle" idx="4294967295"/>
+          </p:nvPr>
+        </p:nvSpPr>
+        <p:spPr>
+          <a:xfrm>
+            <a:off x="5566496" y="1055650"/>
+            <a:ext cx="2729400" cy="572400"/>
           </a:xfrm>
           <a:prstGeom prst="rect">
             <a:avLst/>
@@ -15617,45 +16339,35 @@
           <a:lstStyle/>
           <a:p>
             <a:pPr marL="0" lvl="0" indent="0" algn="l" rtl="0">
-              <a:spcBef>
-                <a:spcPts val="0"/>
-              </a:spcBef>
-              <a:spcAft>
-                <a:spcPts val="0"/>
-              </a:spcAft>
-              <a:buClr>
-                <a:schemeClr val="dk1"/>
-              </a:buClr>
-              <a:buSzPts val="1100"/>
-              <a:buFont typeface="Arial"/>
+              <a:lnSpc>
+                <a:spcPct val="100000"/>
+              </a:lnSpc>
+              <a:spcBef>
+                <a:spcPts val="0"/>
+              </a:spcBef>
+              <a:spcAft>
+                <a:spcPts val="1600"/>
+              </a:spcAft>
               <a:buNone/>
             </a:pPr>
             <a:r>
-              <a:rPr lang="es"/>
-              <a:t>Se requiere instalar software que conecte los datos de los sensores a una interfaz amigable al usuario. Puede ser desde una app celular o un indicador en la pantalla de un automóvil, o una notificación de correo. </a:t>
+              <a:rPr lang="es" sz="1000"/>
+              <a:t>Por medio de sensores conectados a una red notifica a los dispositivos móviles que tengan la aplicación los lugares en donde se necesite atención del gobierno para que no haya zonas contaminadas  </a:t>
             </a:r>
-            <a:endParaRPr/>
+            <a:endParaRPr sz="1000"/>
           </a:p>
         </p:txBody>
       </p:sp>
-      <p:pic>
-        <p:nvPicPr>
-          <p:cNvPr id="82" name="Google Shape;82;p15"/>
-          <p:cNvPicPr preferRelativeResize="0"/>
+      <p:sp>
+        <p:nvSpPr>
+          <p:cNvPr id="204" name="Google Shape;204;p20"/>
+          <p:cNvSpPr txBox="1"/>
           <p:nvPr/>
-        </p:nvPicPr>
-        <p:blipFill>
-          <a:blip r:embed="rId3">
-            <a:alphaModFix/>
-          </a:blip>
-          <a:stretch>
-            <a:fillRect/>
-          </a:stretch>
-        </p:blipFill>
+        </p:nvSpPr>
         <p:spPr>
-          <a:xfrm>
-            <a:off x="6632838" y="1857375"/>
-            <a:ext cx="3720837" cy="3879550"/>
+          <a:xfrm flipH="1">
+            <a:off x="5856552" y="819436"/>
+            <a:ext cx="1002600" cy="264900"/>
           </a:xfrm>
           <a:prstGeom prst="rect">
             <a:avLst/>
@@ -15665,10 +16377,1087 @@
             <a:noFill/>
           </a:ln>
         </p:spPr>
-      </p:pic>
+        <p:txBody>
+          <a:bodyPr spcFirstLastPara="1" wrap="square" lIns="91425" tIns="91425" rIns="91425" bIns="91425" anchor="ctr" anchorCtr="0">
+            <a:noAutofit/>
+          </a:bodyPr>
+          <a:lstStyle/>
+          <a:p>
+            <a:pPr marL="0" lvl="0" indent="0" algn="r" rtl="0">
+              <a:lnSpc>
+                <a:spcPct val="115000"/>
+              </a:lnSpc>
+              <a:spcBef>
+                <a:spcPts val="0"/>
+              </a:spcBef>
+              <a:spcAft>
+                <a:spcPts val="0"/>
+              </a:spcAft>
+              <a:buNone/>
+            </a:pPr>
+            <a:r>
+              <a:rPr lang="es" sz="1200">
+                <a:solidFill>
+                  <a:schemeClr val="lt1"/>
+                </a:solidFill>
+                <a:latin typeface="Unica One"/>
+                <a:ea typeface="Unica One"/>
+                <a:cs typeface="Unica One"/>
+                <a:sym typeface="Unica One"/>
+              </a:rPr>
+              <a:t>Clean City</a:t>
+            </a:r>
+            <a:endParaRPr sz="1100">
+              <a:solidFill>
+                <a:schemeClr val="lt1"/>
+              </a:solidFill>
+              <a:latin typeface="Lato"/>
+              <a:ea typeface="Lato"/>
+              <a:cs typeface="Lato"/>
+              <a:sym typeface="Lato"/>
+            </a:endParaRPr>
+          </a:p>
+        </p:txBody>
+      </p:sp>
       <p:sp>
         <p:nvSpPr>
-          <p:cNvPr id="83" name="Google Shape;83;p15"/>
+          <p:cNvPr id="205" name="Google Shape;205;p20"/>
+          <p:cNvSpPr txBox="1"/>
+          <p:nvPr/>
+        </p:nvSpPr>
+        <p:spPr>
+          <a:xfrm flipH="1">
+            <a:off x="1574575" y="1579613"/>
+            <a:ext cx="1855200" cy="264900"/>
+          </a:xfrm>
+          <a:prstGeom prst="rect">
+            <a:avLst/>
+          </a:prstGeom>
+          <a:noFill/>
+          <a:ln>
+            <a:noFill/>
+          </a:ln>
+        </p:spPr>
+        <p:txBody>
+          <a:bodyPr spcFirstLastPara="1" wrap="square" lIns="91425" tIns="91425" rIns="91425" bIns="91425" anchor="ctr" anchorCtr="0">
+            <a:noAutofit/>
+          </a:bodyPr>
+          <a:lstStyle/>
+          <a:p>
+            <a:pPr marL="914400" lvl="0" indent="0" algn="just" rtl="0">
+              <a:lnSpc>
+                <a:spcPct val="115000"/>
+              </a:lnSpc>
+              <a:spcBef>
+                <a:spcPts val="0"/>
+              </a:spcBef>
+              <a:spcAft>
+                <a:spcPts val="0"/>
+              </a:spcAft>
+              <a:buNone/>
+            </a:pPr>
+            <a:r>
+              <a:rPr lang="es" sz="1300">
+                <a:solidFill>
+                  <a:schemeClr val="lt1"/>
+                </a:solidFill>
+                <a:latin typeface="Unica One"/>
+                <a:ea typeface="Unica One"/>
+                <a:cs typeface="Unica One"/>
+                <a:sym typeface="Unica One"/>
+              </a:rPr>
+              <a:t>Sistema Caliope:</a:t>
+            </a:r>
+            <a:endParaRPr sz="1100">
+              <a:solidFill>
+                <a:schemeClr val="lt1"/>
+              </a:solidFill>
+              <a:latin typeface="Unica One"/>
+              <a:ea typeface="Unica One"/>
+              <a:cs typeface="Unica One"/>
+              <a:sym typeface="Unica One"/>
+            </a:endParaRPr>
+          </a:p>
+        </p:txBody>
+      </p:sp>
+      <p:grpSp>
+        <p:nvGrpSpPr>
+          <p:cNvPr id="206" name="Google Shape;206;p20"/>
+          <p:cNvGrpSpPr/>
+          <p:nvPr/>
+        </p:nvGrpSpPr>
+        <p:grpSpPr>
+          <a:xfrm>
+            <a:off x="4038608" y="634737"/>
+            <a:ext cx="1461093" cy="4014992"/>
+            <a:chOff x="2851825" y="244322"/>
+            <a:chExt cx="1901475" cy="5224453"/>
+          </a:xfrm>
+        </p:grpSpPr>
+        <p:sp>
+          <p:nvSpPr>
+            <p:cNvPr id="207" name="Google Shape;207;p20"/>
+            <p:cNvSpPr/>
+            <p:nvPr/>
+          </p:nvSpPr>
+          <p:spPr>
+            <a:xfrm>
+              <a:off x="2851825" y="4064847"/>
+              <a:ext cx="1901025" cy="1096375"/>
+            </a:xfrm>
+            <a:custGeom>
+              <a:avLst/>
+              <a:gdLst/>
+              <a:ahLst/>
+              <a:cxnLst/>
+              <a:rect l="l" t="t" r="r" b="b"/>
+              <a:pathLst>
+                <a:path w="76041" h="43855" extrusionOk="0">
+                  <a:moveTo>
+                    <a:pt x="37993" y="0"/>
+                  </a:moveTo>
+                  <a:lnTo>
+                    <a:pt x="0" y="21891"/>
+                  </a:lnTo>
+                  <a:lnTo>
+                    <a:pt x="37993" y="43854"/>
+                  </a:lnTo>
+                  <a:lnTo>
+                    <a:pt x="76041" y="21909"/>
+                  </a:lnTo>
+                  <a:lnTo>
+                    <a:pt x="37993" y="0"/>
+                  </a:lnTo>
+                  <a:close/>
+                </a:path>
+              </a:pathLst>
+            </a:custGeom>
+            <a:solidFill>
+              <a:srgbClr val="D0F09F"/>
+            </a:solidFill>
+            <a:ln>
+              <a:noFill/>
+            </a:ln>
+          </p:spPr>
+          <p:txBody>
+            <a:bodyPr spcFirstLastPara="1" wrap="square" lIns="91425" tIns="91425" rIns="91425" bIns="91425" anchor="ctr" anchorCtr="0">
+              <a:noAutofit/>
+            </a:bodyPr>
+            <a:lstStyle/>
+            <a:p>
+              <a:pPr marL="0" lvl="0" indent="0" algn="l" rtl="0">
+                <a:spcBef>
+                  <a:spcPts val="0"/>
+                </a:spcBef>
+                <a:spcAft>
+                  <a:spcPts val="0"/>
+                </a:spcAft>
+                <a:buNone/>
+              </a:pPr>
+              <a:endParaRPr/>
+            </a:p>
+          </p:txBody>
+        </p:sp>
+        <p:sp>
+          <p:nvSpPr>
+            <p:cNvPr id="208" name="Google Shape;208;p20"/>
+            <p:cNvSpPr/>
+            <p:nvPr/>
+          </p:nvSpPr>
+          <p:spPr>
+            <a:xfrm>
+              <a:off x="2851825" y="4605925"/>
+              <a:ext cx="949850" cy="862850"/>
+            </a:xfrm>
+            <a:custGeom>
+              <a:avLst/>
+              <a:gdLst/>
+              <a:ahLst/>
+              <a:cxnLst/>
+              <a:rect l="l" t="t" r="r" b="b"/>
+              <a:pathLst>
+                <a:path w="37994" h="34514" extrusionOk="0">
+                  <a:moveTo>
+                    <a:pt x="0" y="0"/>
+                  </a:moveTo>
+                  <a:lnTo>
+                    <a:pt x="0" y="12568"/>
+                  </a:lnTo>
+                  <a:lnTo>
+                    <a:pt x="37993" y="34513"/>
+                  </a:lnTo>
+                  <a:lnTo>
+                    <a:pt x="37993" y="21963"/>
+                  </a:lnTo>
+                  <a:lnTo>
+                    <a:pt x="0" y="0"/>
+                  </a:lnTo>
+                  <a:close/>
+                </a:path>
+              </a:pathLst>
+            </a:custGeom>
+            <a:solidFill>
+              <a:srgbClr val="96BE97"/>
+            </a:solidFill>
+            <a:ln>
+              <a:noFill/>
+            </a:ln>
+          </p:spPr>
+          <p:txBody>
+            <a:bodyPr spcFirstLastPara="1" wrap="square" lIns="91425" tIns="91425" rIns="91425" bIns="91425" anchor="ctr" anchorCtr="0">
+              <a:noAutofit/>
+            </a:bodyPr>
+            <a:lstStyle/>
+            <a:p>
+              <a:pPr marL="0" lvl="0" indent="0" algn="l" rtl="0">
+                <a:spcBef>
+                  <a:spcPts val="0"/>
+                </a:spcBef>
+                <a:spcAft>
+                  <a:spcPts val="0"/>
+                </a:spcAft>
+                <a:buNone/>
+              </a:pPr>
+              <a:endParaRPr/>
+            </a:p>
+          </p:txBody>
+        </p:sp>
+        <p:sp>
+          <p:nvSpPr>
+            <p:cNvPr id="209" name="Google Shape;209;p20"/>
+            <p:cNvSpPr/>
+            <p:nvPr/>
+          </p:nvSpPr>
+          <p:spPr>
+            <a:xfrm>
+              <a:off x="3795452" y="4605925"/>
+              <a:ext cx="951650" cy="862850"/>
+            </a:xfrm>
+            <a:custGeom>
+              <a:avLst/>
+              <a:gdLst/>
+              <a:ahLst/>
+              <a:cxnLst/>
+              <a:rect l="l" t="t" r="r" b="b"/>
+              <a:pathLst>
+                <a:path w="38066" h="34514" extrusionOk="0">
+                  <a:moveTo>
+                    <a:pt x="38066" y="0"/>
+                  </a:moveTo>
+                  <a:lnTo>
+                    <a:pt x="0" y="21963"/>
+                  </a:lnTo>
+                  <a:lnTo>
+                    <a:pt x="0" y="34513"/>
+                  </a:lnTo>
+                  <a:lnTo>
+                    <a:pt x="38066" y="12568"/>
+                  </a:lnTo>
+                  <a:lnTo>
+                    <a:pt x="38066" y="0"/>
+                  </a:lnTo>
+                  <a:close/>
+                </a:path>
+              </a:pathLst>
+            </a:custGeom>
+            <a:solidFill>
+              <a:srgbClr val="A3CEA3"/>
+            </a:solidFill>
+            <a:ln>
+              <a:noFill/>
+            </a:ln>
+          </p:spPr>
+          <p:txBody>
+            <a:bodyPr spcFirstLastPara="1" wrap="square" lIns="91425" tIns="91425" rIns="91425" bIns="91425" anchor="ctr" anchorCtr="0">
+              <a:noAutofit/>
+            </a:bodyPr>
+            <a:lstStyle/>
+            <a:p>
+              <a:pPr marL="0" lvl="0" indent="0" algn="l" rtl="0">
+                <a:spcBef>
+                  <a:spcPts val="0"/>
+                </a:spcBef>
+                <a:spcAft>
+                  <a:spcPts val="0"/>
+                </a:spcAft>
+                <a:buNone/>
+              </a:pPr>
+              <a:endParaRPr/>
+            </a:p>
+          </p:txBody>
+        </p:sp>
+        <p:sp>
+          <p:nvSpPr>
+            <p:cNvPr id="210" name="Google Shape;210;p20"/>
+            <p:cNvSpPr/>
+            <p:nvPr/>
+          </p:nvSpPr>
+          <p:spPr>
+            <a:xfrm>
+              <a:off x="2851825" y="3103400"/>
+              <a:ext cx="1901025" cy="1096375"/>
+            </a:xfrm>
+            <a:custGeom>
+              <a:avLst/>
+              <a:gdLst/>
+              <a:ahLst/>
+              <a:cxnLst/>
+              <a:rect l="l" t="t" r="r" b="b"/>
+              <a:pathLst>
+                <a:path w="76041" h="43855" extrusionOk="0">
+                  <a:moveTo>
+                    <a:pt x="37993" y="0"/>
+                  </a:moveTo>
+                  <a:lnTo>
+                    <a:pt x="0" y="21909"/>
+                  </a:lnTo>
+                  <a:lnTo>
+                    <a:pt x="37993" y="43854"/>
+                  </a:lnTo>
+                  <a:lnTo>
+                    <a:pt x="76041" y="21909"/>
+                  </a:lnTo>
+                  <a:lnTo>
+                    <a:pt x="37993" y="0"/>
+                  </a:lnTo>
+                  <a:close/>
+                </a:path>
+              </a:pathLst>
+            </a:custGeom>
+            <a:solidFill>
+              <a:srgbClr val="589EA5"/>
+            </a:solidFill>
+            <a:ln>
+              <a:noFill/>
+            </a:ln>
+          </p:spPr>
+          <p:txBody>
+            <a:bodyPr spcFirstLastPara="1" wrap="square" lIns="91425" tIns="91425" rIns="91425" bIns="91425" anchor="ctr" anchorCtr="0">
+              <a:noAutofit/>
+            </a:bodyPr>
+            <a:lstStyle/>
+            <a:p>
+              <a:pPr marL="0" lvl="0" indent="0" algn="l" rtl="0">
+                <a:spcBef>
+                  <a:spcPts val="0"/>
+                </a:spcBef>
+                <a:spcAft>
+                  <a:spcPts val="0"/>
+                </a:spcAft>
+                <a:buNone/>
+              </a:pPr>
+              <a:endParaRPr/>
+            </a:p>
+          </p:txBody>
+        </p:sp>
+        <p:sp>
+          <p:nvSpPr>
+            <p:cNvPr id="211" name="Google Shape;211;p20"/>
+            <p:cNvSpPr/>
+            <p:nvPr/>
+          </p:nvSpPr>
+          <p:spPr>
+            <a:xfrm>
+              <a:off x="2851825" y="3651125"/>
+              <a:ext cx="949850" cy="862850"/>
+            </a:xfrm>
+            <a:custGeom>
+              <a:avLst/>
+              <a:gdLst/>
+              <a:ahLst/>
+              <a:cxnLst/>
+              <a:rect l="l" t="t" r="r" b="b"/>
+              <a:pathLst>
+                <a:path w="37994" h="34514" extrusionOk="0">
+                  <a:moveTo>
+                    <a:pt x="0" y="0"/>
+                  </a:moveTo>
+                  <a:lnTo>
+                    <a:pt x="0" y="12551"/>
+                  </a:lnTo>
+                  <a:lnTo>
+                    <a:pt x="37993" y="34514"/>
+                  </a:lnTo>
+                  <a:lnTo>
+                    <a:pt x="37993" y="21945"/>
+                  </a:lnTo>
+                  <a:lnTo>
+                    <a:pt x="0" y="0"/>
+                  </a:lnTo>
+                  <a:close/>
+                </a:path>
+              </a:pathLst>
+            </a:custGeom>
+            <a:solidFill>
+              <a:srgbClr val="295568"/>
+            </a:solidFill>
+            <a:ln>
+              <a:noFill/>
+            </a:ln>
+          </p:spPr>
+          <p:txBody>
+            <a:bodyPr spcFirstLastPara="1" wrap="square" lIns="91425" tIns="91425" rIns="91425" bIns="91425" anchor="ctr" anchorCtr="0">
+              <a:noAutofit/>
+            </a:bodyPr>
+            <a:lstStyle/>
+            <a:p>
+              <a:pPr marL="0" lvl="0" indent="0" algn="l" rtl="0">
+                <a:spcBef>
+                  <a:spcPts val="0"/>
+                </a:spcBef>
+                <a:spcAft>
+                  <a:spcPts val="0"/>
+                </a:spcAft>
+                <a:buNone/>
+              </a:pPr>
+              <a:endParaRPr/>
+            </a:p>
+          </p:txBody>
+        </p:sp>
+        <p:sp>
+          <p:nvSpPr>
+            <p:cNvPr id="212" name="Google Shape;212;p20"/>
+            <p:cNvSpPr/>
+            <p:nvPr/>
+          </p:nvSpPr>
+          <p:spPr>
+            <a:xfrm>
+              <a:off x="3795452" y="3651125"/>
+              <a:ext cx="951650" cy="862850"/>
+            </a:xfrm>
+            <a:custGeom>
+              <a:avLst/>
+              <a:gdLst/>
+              <a:ahLst/>
+              <a:cxnLst/>
+              <a:rect l="l" t="t" r="r" b="b"/>
+              <a:pathLst>
+                <a:path w="38066" h="34514" extrusionOk="0">
+                  <a:moveTo>
+                    <a:pt x="38066" y="0"/>
+                  </a:moveTo>
+                  <a:lnTo>
+                    <a:pt x="0" y="21945"/>
+                  </a:lnTo>
+                  <a:lnTo>
+                    <a:pt x="0" y="34514"/>
+                  </a:lnTo>
+                  <a:lnTo>
+                    <a:pt x="38066" y="12551"/>
+                  </a:lnTo>
+                  <a:lnTo>
+                    <a:pt x="38066" y="0"/>
+                  </a:lnTo>
+                  <a:close/>
+                </a:path>
+              </a:pathLst>
+            </a:custGeom>
+            <a:solidFill>
+              <a:srgbClr val="3E738A"/>
+            </a:solidFill>
+            <a:ln>
+              <a:noFill/>
+            </a:ln>
+          </p:spPr>
+          <p:txBody>
+            <a:bodyPr spcFirstLastPara="1" wrap="square" lIns="91425" tIns="91425" rIns="91425" bIns="91425" anchor="ctr" anchorCtr="0">
+              <a:noAutofit/>
+            </a:bodyPr>
+            <a:lstStyle/>
+            <a:p>
+              <a:pPr marL="0" lvl="0" indent="0" algn="l" rtl="0">
+                <a:spcBef>
+                  <a:spcPts val="0"/>
+                </a:spcBef>
+                <a:spcAft>
+                  <a:spcPts val="0"/>
+                </a:spcAft>
+                <a:buNone/>
+              </a:pPr>
+              <a:endParaRPr/>
+            </a:p>
+          </p:txBody>
+        </p:sp>
+        <p:sp>
+          <p:nvSpPr>
+            <p:cNvPr id="213" name="Google Shape;213;p20"/>
+            <p:cNvSpPr/>
+            <p:nvPr/>
+          </p:nvSpPr>
+          <p:spPr>
+            <a:xfrm>
+              <a:off x="2851825" y="2154347"/>
+              <a:ext cx="1901025" cy="1096825"/>
+            </a:xfrm>
+            <a:custGeom>
+              <a:avLst/>
+              <a:gdLst/>
+              <a:ahLst/>
+              <a:cxnLst/>
+              <a:rect l="l" t="t" r="r" b="b"/>
+              <a:pathLst>
+                <a:path w="76041" h="43873" extrusionOk="0">
+                  <a:moveTo>
+                    <a:pt x="37993" y="1"/>
+                  </a:moveTo>
+                  <a:lnTo>
+                    <a:pt x="0" y="21910"/>
+                  </a:lnTo>
+                  <a:lnTo>
+                    <a:pt x="37993" y="43873"/>
+                  </a:lnTo>
+                  <a:lnTo>
+                    <a:pt x="76041" y="21910"/>
+                  </a:lnTo>
+                  <a:lnTo>
+                    <a:pt x="37993" y="1"/>
+                  </a:lnTo>
+                  <a:close/>
+                </a:path>
+              </a:pathLst>
+            </a:custGeom>
+            <a:solidFill>
+              <a:srgbClr val="D0F09F"/>
+            </a:solidFill>
+            <a:ln>
+              <a:noFill/>
+            </a:ln>
+          </p:spPr>
+          <p:txBody>
+            <a:bodyPr spcFirstLastPara="1" wrap="square" lIns="91425" tIns="91425" rIns="91425" bIns="91425" anchor="ctr" anchorCtr="0">
+              <a:noAutofit/>
+            </a:bodyPr>
+            <a:lstStyle/>
+            <a:p>
+              <a:pPr marL="0" lvl="0" indent="0" algn="l" rtl="0">
+                <a:spcBef>
+                  <a:spcPts val="0"/>
+                </a:spcBef>
+                <a:spcAft>
+                  <a:spcPts val="0"/>
+                </a:spcAft>
+                <a:buNone/>
+              </a:pPr>
+              <a:endParaRPr/>
+            </a:p>
+          </p:txBody>
+        </p:sp>
+        <p:sp>
+          <p:nvSpPr>
+            <p:cNvPr id="214" name="Google Shape;214;p20"/>
+            <p:cNvSpPr/>
+            <p:nvPr/>
+          </p:nvSpPr>
+          <p:spPr>
+            <a:xfrm>
+              <a:off x="2851825" y="2695875"/>
+              <a:ext cx="949850" cy="862850"/>
+            </a:xfrm>
+            <a:custGeom>
+              <a:avLst/>
+              <a:gdLst/>
+              <a:ahLst/>
+              <a:cxnLst/>
+              <a:rect l="l" t="t" r="r" b="b"/>
+              <a:pathLst>
+                <a:path w="37994" h="34514" extrusionOk="0">
+                  <a:moveTo>
+                    <a:pt x="0" y="1"/>
+                  </a:moveTo>
+                  <a:lnTo>
+                    <a:pt x="0" y="12569"/>
+                  </a:lnTo>
+                  <a:lnTo>
+                    <a:pt x="37993" y="34514"/>
+                  </a:lnTo>
+                  <a:lnTo>
+                    <a:pt x="37993" y="21964"/>
+                  </a:lnTo>
+                  <a:lnTo>
+                    <a:pt x="0" y="1"/>
+                  </a:lnTo>
+                  <a:close/>
+                </a:path>
+              </a:pathLst>
+            </a:custGeom>
+            <a:solidFill>
+              <a:srgbClr val="96BE97"/>
+            </a:solidFill>
+            <a:ln>
+              <a:noFill/>
+            </a:ln>
+          </p:spPr>
+          <p:txBody>
+            <a:bodyPr spcFirstLastPara="1" wrap="square" lIns="91425" tIns="91425" rIns="91425" bIns="91425" anchor="ctr" anchorCtr="0">
+              <a:noAutofit/>
+            </a:bodyPr>
+            <a:lstStyle/>
+            <a:p>
+              <a:pPr marL="0" lvl="0" indent="0" algn="l" rtl="0">
+                <a:spcBef>
+                  <a:spcPts val="0"/>
+                </a:spcBef>
+                <a:spcAft>
+                  <a:spcPts val="0"/>
+                </a:spcAft>
+                <a:buNone/>
+              </a:pPr>
+              <a:endParaRPr/>
+            </a:p>
+          </p:txBody>
+        </p:sp>
+        <p:sp>
+          <p:nvSpPr>
+            <p:cNvPr id="215" name="Google Shape;215;p20"/>
+            <p:cNvSpPr/>
+            <p:nvPr/>
+          </p:nvSpPr>
+          <p:spPr>
+            <a:xfrm>
+              <a:off x="3801650" y="2695875"/>
+              <a:ext cx="951650" cy="862850"/>
+            </a:xfrm>
+            <a:custGeom>
+              <a:avLst/>
+              <a:gdLst/>
+              <a:ahLst/>
+              <a:cxnLst/>
+              <a:rect l="l" t="t" r="r" b="b"/>
+              <a:pathLst>
+                <a:path w="38066" h="34514" extrusionOk="0">
+                  <a:moveTo>
+                    <a:pt x="38066" y="1"/>
+                  </a:moveTo>
+                  <a:lnTo>
+                    <a:pt x="0" y="21964"/>
+                  </a:lnTo>
+                  <a:lnTo>
+                    <a:pt x="0" y="34514"/>
+                  </a:lnTo>
+                  <a:lnTo>
+                    <a:pt x="38066" y="12569"/>
+                  </a:lnTo>
+                  <a:lnTo>
+                    <a:pt x="38066" y="1"/>
+                  </a:lnTo>
+                  <a:close/>
+                </a:path>
+              </a:pathLst>
+            </a:custGeom>
+            <a:solidFill>
+              <a:srgbClr val="A3CEA3"/>
+            </a:solidFill>
+            <a:ln>
+              <a:noFill/>
+            </a:ln>
+          </p:spPr>
+          <p:txBody>
+            <a:bodyPr spcFirstLastPara="1" wrap="square" lIns="91425" tIns="91425" rIns="91425" bIns="91425" anchor="ctr" anchorCtr="0">
+              <a:noAutofit/>
+            </a:bodyPr>
+            <a:lstStyle/>
+            <a:p>
+              <a:pPr marL="0" lvl="0" indent="0" algn="l" rtl="0">
+                <a:spcBef>
+                  <a:spcPts val="0"/>
+                </a:spcBef>
+                <a:spcAft>
+                  <a:spcPts val="0"/>
+                </a:spcAft>
+                <a:buNone/>
+              </a:pPr>
+              <a:endParaRPr/>
+            </a:p>
+          </p:txBody>
+        </p:sp>
+        <p:sp>
+          <p:nvSpPr>
+            <p:cNvPr id="216" name="Google Shape;216;p20"/>
+            <p:cNvSpPr/>
+            <p:nvPr/>
+          </p:nvSpPr>
+          <p:spPr>
+            <a:xfrm>
+              <a:off x="2851825" y="1193350"/>
+              <a:ext cx="1901025" cy="1096375"/>
+            </a:xfrm>
+            <a:custGeom>
+              <a:avLst/>
+              <a:gdLst/>
+              <a:ahLst/>
+              <a:cxnLst/>
+              <a:rect l="l" t="t" r="r" b="b"/>
+              <a:pathLst>
+                <a:path w="76041" h="43855" extrusionOk="0">
+                  <a:moveTo>
+                    <a:pt x="37993" y="1"/>
+                  </a:moveTo>
+                  <a:lnTo>
+                    <a:pt x="0" y="21910"/>
+                  </a:lnTo>
+                  <a:lnTo>
+                    <a:pt x="37993" y="43855"/>
+                  </a:lnTo>
+                  <a:lnTo>
+                    <a:pt x="76041" y="21910"/>
+                  </a:lnTo>
+                  <a:lnTo>
+                    <a:pt x="37993" y="1"/>
+                  </a:lnTo>
+                  <a:close/>
+                </a:path>
+              </a:pathLst>
+            </a:custGeom>
+            <a:solidFill>
+              <a:srgbClr val="589EA5"/>
+            </a:solidFill>
+            <a:ln>
+              <a:noFill/>
+            </a:ln>
+          </p:spPr>
+          <p:txBody>
+            <a:bodyPr spcFirstLastPara="1" wrap="square" lIns="91425" tIns="91425" rIns="91425" bIns="91425" anchor="ctr" anchorCtr="0">
+              <a:noAutofit/>
+            </a:bodyPr>
+            <a:lstStyle/>
+            <a:p>
+              <a:pPr marL="0" lvl="0" indent="0" algn="l" rtl="0">
+                <a:spcBef>
+                  <a:spcPts val="0"/>
+                </a:spcBef>
+                <a:spcAft>
+                  <a:spcPts val="0"/>
+                </a:spcAft>
+                <a:buNone/>
+              </a:pPr>
+              <a:endParaRPr/>
+            </a:p>
+          </p:txBody>
+        </p:sp>
+        <p:sp>
+          <p:nvSpPr>
+            <p:cNvPr id="217" name="Google Shape;217;p20"/>
+            <p:cNvSpPr/>
+            <p:nvPr/>
+          </p:nvSpPr>
+          <p:spPr>
+            <a:xfrm>
+              <a:off x="2851825" y="1741075"/>
+              <a:ext cx="949850" cy="862400"/>
+            </a:xfrm>
+            <a:custGeom>
+              <a:avLst/>
+              <a:gdLst/>
+              <a:ahLst/>
+              <a:cxnLst/>
+              <a:rect l="l" t="t" r="r" b="b"/>
+              <a:pathLst>
+                <a:path w="37994" h="34496" extrusionOk="0">
+                  <a:moveTo>
+                    <a:pt x="0" y="1"/>
+                  </a:moveTo>
+                  <a:lnTo>
+                    <a:pt x="0" y="12551"/>
+                  </a:lnTo>
+                  <a:lnTo>
+                    <a:pt x="37993" y="34496"/>
+                  </a:lnTo>
+                  <a:lnTo>
+                    <a:pt x="37993" y="21946"/>
+                  </a:lnTo>
+                  <a:lnTo>
+                    <a:pt x="0" y="1"/>
+                  </a:lnTo>
+                  <a:close/>
+                </a:path>
+              </a:pathLst>
+            </a:custGeom>
+            <a:solidFill>
+              <a:srgbClr val="295568"/>
+            </a:solidFill>
+            <a:ln>
+              <a:noFill/>
+            </a:ln>
+          </p:spPr>
+          <p:txBody>
+            <a:bodyPr spcFirstLastPara="1" wrap="square" lIns="91425" tIns="91425" rIns="91425" bIns="91425" anchor="ctr" anchorCtr="0">
+              <a:noAutofit/>
+            </a:bodyPr>
+            <a:lstStyle/>
+            <a:p>
+              <a:pPr marL="0" lvl="0" indent="0" algn="l" rtl="0">
+                <a:spcBef>
+                  <a:spcPts val="0"/>
+                </a:spcBef>
+                <a:spcAft>
+                  <a:spcPts val="0"/>
+                </a:spcAft>
+                <a:buNone/>
+              </a:pPr>
+              <a:endParaRPr/>
+            </a:p>
+          </p:txBody>
+        </p:sp>
+        <p:sp>
+          <p:nvSpPr>
+            <p:cNvPr id="218" name="Google Shape;218;p20"/>
+            <p:cNvSpPr/>
+            <p:nvPr/>
+          </p:nvSpPr>
+          <p:spPr>
+            <a:xfrm>
+              <a:off x="3795452" y="1741075"/>
+              <a:ext cx="951650" cy="862400"/>
+            </a:xfrm>
+            <a:custGeom>
+              <a:avLst/>
+              <a:gdLst/>
+              <a:ahLst/>
+              <a:cxnLst/>
+              <a:rect l="l" t="t" r="r" b="b"/>
+              <a:pathLst>
+                <a:path w="38066" h="34496" extrusionOk="0">
+                  <a:moveTo>
+                    <a:pt x="38066" y="1"/>
+                  </a:moveTo>
+                  <a:lnTo>
+                    <a:pt x="0" y="21946"/>
+                  </a:lnTo>
+                  <a:lnTo>
+                    <a:pt x="0" y="34496"/>
+                  </a:lnTo>
+                  <a:lnTo>
+                    <a:pt x="38066" y="12551"/>
+                  </a:lnTo>
+                  <a:lnTo>
+                    <a:pt x="38066" y="1"/>
+                  </a:lnTo>
+                  <a:close/>
+                </a:path>
+              </a:pathLst>
+            </a:custGeom>
+            <a:solidFill>
+              <a:srgbClr val="3E738A"/>
+            </a:solidFill>
+            <a:ln>
+              <a:noFill/>
+            </a:ln>
+          </p:spPr>
+          <p:txBody>
+            <a:bodyPr spcFirstLastPara="1" wrap="square" lIns="91425" tIns="91425" rIns="91425" bIns="91425" anchor="ctr" anchorCtr="0">
+              <a:noAutofit/>
+            </a:bodyPr>
+            <a:lstStyle/>
+            <a:p>
+              <a:pPr marL="0" lvl="0" indent="0" algn="l" rtl="0">
+                <a:spcBef>
+                  <a:spcPts val="0"/>
+                </a:spcBef>
+                <a:spcAft>
+                  <a:spcPts val="0"/>
+                </a:spcAft>
+                <a:buNone/>
+              </a:pPr>
+              <a:endParaRPr/>
+            </a:p>
+          </p:txBody>
+        </p:sp>
+        <p:sp>
+          <p:nvSpPr>
+            <p:cNvPr id="219" name="Google Shape;219;p20"/>
+            <p:cNvSpPr/>
+            <p:nvPr/>
+          </p:nvSpPr>
+          <p:spPr>
+            <a:xfrm>
+              <a:off x="2851825" y="244322"/>
+              <a:ext cx="1901025" cy="1096350"/>
+            </a:xfrm>
+            <a:custGeom>
+              <a:avLst/>
+              <a:gdLst/>
+              <a:ahLst/>
+              <a:cxnLst/>
+              <a:rect l="l" t="t" r="r" b="b"/>
+              <a:pathLst>
+                <a:path w="76041" h="43854" extrusionOk="0">
+                  <a:moveTo>
+                    <a:pt x="37993" y="0"/>
+                  </a:moveTo>
+                  <a:lnTo>
+                    <a:pt x="0" y="21909"/>
+                  </a:lnTo>
+                  <a:lnTo>
+                    <a:pt x="37993" y="43854"/>
+                  </a:lnTo>
+                  <a:lnTo>
+                    <a:pt x="76041" y="21909"/>
+                  </a:lnTo>
+                  <a:lnTo>
+                    <a:pt x="37993" y="0"/>
+                  </a:lnTo>
+                  <a:close/>
+                </a:path>
+              </a:pathLst>
+            </a:custGeom>
+            <a:solidFill>
+              <a:srgbClr val="D0F09F"/>
+            </a:solidFill>
+            <a:ln>
+              <a:noFill/>
+            </a:ln>
+          </p:spPr>
+          <p:txBody>
+            <a:bodyPr spcFirstLastPara="1" wrap="square" lIns="91425" tIns="91425" rIns="91425" bIns="91425" anchor="ctr" anchorCtr="0">
+              <a:noAutofit/>
+            </a:bodyPr>
+            <a:lstStyle/>
+            <a:p>
+              <a:pPr marL="0" lvl="0" indent="0" algn="l" rtl="0">
+                <a:spcBef>
+                  <a:spcPts val="0"/>
+                </a:spcBef>
+                <a:spcAft>
+                  <a:spcPts val="0"/>
+                </a:spcAft>
+                <a:buNone/>
+              </a:pPr>
+              <a:endParaRPr/>
+            </a:p>
+          </p:txBody>
+        </p:sp>
+        <p:sp>
+          <p:nvSpPr>
+            <p:cNvPr id="220" name="Google Shape;220;p20"/>
+            <p:cNvSpPr/>
+            <p:nvPr/>
+          </p:nvSpPr>
+          <p:spPr>
+            <a:xfrm>
+              <a:off x="2851825" y="785825"/>
+              <a:ext cx="949850" cy="862875"/>
+            </a:xfrm>
+            <a:custGeom>
+              <a:avLst/>
+              <a:gdLst/>
+              <a:ahLst/>
+              <a:cxnLst/>
+              <a:rect l="l" t="t" r="r" b="b"/>
+              <a:pathLst>
+                <a:path w="37994" h="34515" extrusionOk="0">
+                  <a:moveTo>
+                    <a:pt x="0" y="1"/>
+                  </a:moveTo>
+                  <a:lnTo>
+                    <a:pt x="0" y="12551"/>
+                  </a:lnTo>
+                  <a:lnTo>
+                    <a:pt x="37993" y="34514"/>
+                  </a:lnTo>
+                  <a:lnTo>
+                    <a:pt x="37993" y="21946"/>
+                  </a:lnTo>
+                  <a:lnTo>
+                    <a:pt x="0" y="1"/>
+                  </a:lnTo>
+                  <a:close/>
+                </a:path>
+              </a:pathLst>
+            </a:custGeom>
+            <a:solidFill>
+              <a:srgbClr val="96BE97"/>
+            </a:solidFill>
+            <a:ln>
+              <a:noFill/>
+            </a:ln>
+          </p:spPr>
+          <p:txBody>
+            <a:bodyPr spcFirstLastPara="1" wrap="square" lIns="91425" tIns="91425" rIns="91425" bIns="91425" anchor="ctr" anchorCtr="0">
+              <a:noAutofit/>
+            </a:bodyPr>
+            <a:lstStyle/>
+            <a:p>
+              <a:pPr marL="0" lvl="0" indent="0" algn="l" rtl="0">
+                <a:spcBef>
+                  <a:spcPts val="0"/>
+                </a:spcBef>
+                <a:spcAft>
+                  <a:spcPts val="0"/>
+                </a:spcAft>
+                <a:buNone/>
+              </a:pPr>
+              <a:endParaRPr/>
+            </a:p>
+          </p:txBody>
+        </p:sp>
+        <p:sp>
+          <p:nvSpPr>
+            <p:cNvPr id="221" name="Google Shape;221;p20"/>
+            <p:cNvSpPr/>
+            <p:nvPr/>
+          </p:nvSpPr>
+          <p:spPr>
+            <a:xfrm>
+              <a:off x="3801650" y="785825"/>
+              <a:ext cx="951650" cy="862875"/>
+            </a:xfrm>
+            <a:custGeom>
+              <a:avLst/>
+              <a:gdLst/>
+              <a:ahLst/>
+              <a:cxnLst/>
+              <a:rect l="l" t="t" r="r" b="b"/>
+              <a:pathLst>
+                <a:path w="38066" h="34515" extrusionOk="0">
+                  <a:moveTo>
+                    <a:pt x="38066" y="1"/>
+                  </a:moveTo>
+                  <a:lnTo>
+                    <a:pt x="0" y="21946"/>
+                  </a:lnTo>
+                  <a:lnTo>
+                    <a:pt x="0" y="34514"/>
+                  </a:lnTo>
+                  <a:lnTo>
+                    <a:pt x="38066" y="12551"/>
+                  </a:lnTo>
+                  <a:lnTo>
+                    <a:pt x="38066" y="1"/>
+                  </a:lnTo>
+                  <a:close/>
+                </a:path>
+              </a:pathLst>
+            </a:custGeom>
+            <a:solidFill>
+              <a:srgbClr val="A3CEA3"/>
+            </a:solidFill>
+            <a:ln>
+              <a:noFill/>
+            </a:ln>
+          </p:spPr>
+          <p:txBody>
+            <a:bodyPr spcFirstLastPara="1" wrap="square" lIns="91425" tIns="91425" rIns="91425" bIns="91425" anchor="ctr" anchorCtr="0">
+              <a:noAutofit/>
+            </a:bodyPr>
+            <a:lstStyle/>
+            <a:p>
+              <a:pPr marL="0" lvl="0" indent="0" algn="l" rtl="0">
+                <a:spcBef>
+                  <a:spcPts val="0"/>
+                </a:spcBef>
+                <a:spcAft>
+                  <a:spcPts val="0"/>
+                </a:spcAft>
+                <a:buNone/>
+              </a:pPr>
+              <a:endParaRPr/>
+            </a:p>
+          </p:txBody>
+        </p:sp>
+      </p:grpSp>
+      <p:sp>
+        <p:nvSpPr>
+          <p:cNvPr id="222" name="Google Shape;222;p20"/>
           <p:cNvSpPr txBox="1">
             <a:spLocks noGrp="1"/>
           </p:cNvSpPr>
@@ -15678,8 +17467,8 @@
         </p:nvSpPr>
         <p:spPr>
           <a:xfrm>
-            <a:off x="-65400" y="370850"/>
-            <a:ext cx="2013600" cy="946200"/>
+            <a:off x="-435675" y="420525"/>
+            <a:ext cx="2650500" cy="946200"/>
           </a:xfrm>
           <a:prstGeom prst="rect">
             <a:avLst/>
@@ -15691,41 +17480,49 @@
           </a:bodyPr>
           <a:lstStyle/>
           <a:p>
-            <a:pPr marL="0" lvl="0" indent="0" algn="l" rtl="0">
-              <a:spcBef>
-                <a:spcPts val="0"/>
-              </a:spcBef>
-              <a:spcAft>
-                <a:spcPts val="0"/>
-              </a:spcAft>
+            <a:pPr marL="457200" lvl="0" indent="0" algn="l" rtl="0">
+              <a:lnSpc>
+                <a:spcPct val="115000"/>
+              </a:lnSpc>
+              <a:spcBef>
+                <a:spcPts val="0"/>
+              </a:spcBef>
+              <a:spcAft>
+                <a:spcPts val="0"/>
+              </a:spcAft>
+              <a:buClr>
+                <a:schemeClr val="dk1"/>
+              </a:buClr>
+              <a:buSzPts val="1100"/>
+              <a:buFont typeface="Arial"/>
               <a:buNone/>
             </a:pPr>
             <a:r>
-              <a:rPr lang="es" sz="1700"/>
-              <a:t>¿Cómo lo harías?</a:t>
+              <a:rPr lang="es"/>
+              <a:t>¿Existe algo parecido que ya se ha implementado?</a:t>
             </a:r>
-            <a:endParaRPr sz="1700"/>
+            <a:endParaRPr/>
           </a:p>
         </p:txBody>
       </p:sp>
       <p:sp>
         <p:nvSpPr>
-          <p:cNvPr id="84" name="Google Shape;84;p15"/>
-          <p:cNvSpPr txBox="1">
-            <a:spLocks noGrp="1"/>
-          </p:cNvSpPr>
-          <p:nvPr>
-            <p:ph type="ctrTitle"/>
-          </p:nvPr>
+          <p:cNvPr id="223" name="Google Shape;223;p20"/>
+          <p:cNvSpPr txBox="1"/>
+          <p:nvPr/>
         </p:nvSpPr>
         <p:spPr>
-          <a:xfrm>
-            <a:off x="2228850" y="2678025"/>
-            <a:ext cx="2806800" cy="477000"/>
+          <a:xfrm flipH="1">
+            <a:off x="1574575" y="3017913"/>
+            <a:ext cx="1855200" cy="264900"/>
           </a:xfrm>
           <a:prstGeom prst="rect">
             <a:avLst/>
           </a:prstGeom>
+          <a:noFill/>
+          <a:ln>
+            <a:noFill/>
+          </a:ln>
         </p:spPr>
         <p:txBody>
           <a:bodyPr spcFirstLastPara="1" wrap="square" lIns="91425" tIns="91425" rIns="91425" bIns="91425" anchor="ctr" anchorCtr="0">
@@ -15733,7 +17530,10 @@
           </a:bodyPr>
           <a:lstStyle/>
           <a:p>
-            <a:pPr marL="0" lvl="0" indent="0" algn="l" rtl="0">
+            <a:pPr marL="914400" lvl="0" indent="0" algn="just" rtl="0">
+              <a:lnSpc>
+                <a:spcPct val="115000"/>
+              </a:lnSpc>
               <a:spcBef>
                 <a:spcPts val="0"/>
               </a:spcBef>
@@ -15743,27 +17543,165 @@
               <a:buNone/>
             </a:pPr>
             <a:r>
-              <a:rPr lang="es"/>
-              <a:t>Dispositivos</a:t>
+              <a:rPr lang="es" sz="1300">
+                <a:solidFill>
+                  <a:schemeClr val="lt1"/>
+                </a:solidFill>
+                <a:latin typeface="Unica One"/>
+                <a:ea typeface="Unica One"/>
+                <a:cs typeface="Unica One"/>
+                <a:sym typeface="Unica One"/>
+              </a:rPr>
+              <a:t>Air Visual</a:t>
             </a:r>
-            <a:endParaRPr/>
+            <a:endParaRPr sz="1100">
+              <a:solidFill>
+                <a:schemeClr val="lt1"/>
+              </a:solidFill>
+              <a:latin typeface="Unica One"/>
+              <a:ea typeface="Unica One"/>
+              <a:cs typeface="Unica One"/>
+              <a:sym typeface="Unica One"/>
+            </a:endParaRPr>
           </a:p>
         </p:txBody>
       </p:sp>
       <p:sp>
         <p:nvSpPr>
-          <p:cNvPr id="85" name="Google Shape;85;p15"/>
+          <p:cNvPr id="224" name="Google Shape;224;p20"/>
+          <p:cNvSpPr txBox="1"/>
+          <p:nvPr/>
+        </p:nvSpPr>
+        <p:spPr>
+          <a:xfrm flipH="1">
+            <a:off x="4962650" y="3695988"/>
+            <a:ext cx="1855200" cy="264900"/>
+          </a:xfrm>
+          <a:prstGeom prst="rect">
+            <a:avLst/>
+          </a:prstGeom>
+          <a:noFill/>
+          <a:ln>
+            <a:noFill/>
+          </a:ln>
+        </p:spPr>
+        <p:txBody>
+          <a:bodyPr spcFirstLastPara="1" wrap="square" lIns="91425" tIns="91425" rIns="91425" bIns="91425" anchor="ctr" anchorCtr="0">
+            <a:noAutofit/>
+          </a:bodyPr>
+          <a:lstStyle/>
+          <a:p>
+            <a:pPr marL="914400" lvl="0" indent="0" algn="r" rtl="0">
+              <a:lnSpc>
+                <a:spcPct val="115000"/>
+              </a:lnSpc>
+              <a:spcBef>
+                <a:spcPts val="0"/>
+              </a:spcBef>
+              <a:spcAft>
+                <a:spcPts val="0"/>
+              </a:spcAft>
+              <a:buNone/>
+            </a:pPr>
+            <a:r>
+              <a:rPr lang="es" sz="1300">
+                <a:solidFill>
+                  <a:schemeClr val="lt1"/>
+                </a:solidFill>
+                <a:latin typeface="Unica One"/>
+                <a:ea typeface="Unica One"/>
+                <a:cs typeface="Unica One"/>
+                <a:sym typeface="Unica One"/>
+              </a:rPr>
+              <a:t>Plume air report</a:t>
+            </a:r>
+            <a:endParaRPr sz="1100">
+              <a:solidFill>
+                <a:schemeClr val="lt1"/>
+              </a:solidFill>
+              <a:latin typeface="Unica One"/>
+              <a:ea typeface="Unica One"/>
+              <a:cs typeface="Unica One"/>
+              <a:sym typeface="Unica One"/>
+            </a:endParaRPr>
+          </a:p>
+        </p:txBody>
+      </p:sp>
+      <p:sp>
+        <p:nvSpPr>
+          <p:cNvPr id="225" name="Google Shape;225;p20"/>
+          <p:cNvSpPr txBox="1"/>
+          <p:nvPr/>
+        </p:nvSpPr>
+        <p:spPr>
+          <a:xfrm flipH="1">
+            <a:off x="5215075" y="2357963"/>
+            <a:ext cx="1855200" cy="264900"/>
+          </a:xfrm>
+          <a:prstGeom prst="rect">
+            <a:avLst/>
+          </a:prstGeom>
+          <a:noFill/>
+          <a:ln>
+            <a:noFill/>
+          </a:ln>
+        </p:spPr>
+        <p:txBody>
+          <a:bodyPr spcFirstLastPara="1" wrap="square" lIns="91425" tIns="91425" rIns="91425" bIns="91425" anchor="ctr" anchorCtr="0">
+            <a:noAutofit/>
+          </a:bodyPr>
+          <a:lstStyle/>
+          <a:p>
+            <a:pPr marL="914400" lvl="0" indent="0" algn="just" rtl="0">
+              <a:lnSpc>
+                <a:spcPct val="115000"/>
+              </a:lnSpc>
+              <a:spcBef>
+                <a:spcPts val="0"/>
+              </a:spcBef>
+              <a:spcAft>
+                <a:spcPts val="0"/>
+              </a:spcAft>
+              <a:buNone/>
+            </a:pPr>
+            <a:r>
+              <a:rPr lang="es" sz="1300">
+                <a:solidFill>
+                  <a:schemeClr val="lt1"/>
+                </a:solidFill>
+                <a:latin typeface="Unica One"/>
+                <a:ea typeface="Unica One"/>
+                <a:cs typeface="Unica One"/>
+                <a:sym typeface="Unica One"/>
+              </a:rPr>
+              <a:t>airACT</a:t>
+            </a:r>
+            <a:endParaRPr sz="1100">
+              <a:solidFill>
+                <a:schemeClr val="lt1"/>
+              </a:solidFill>
+              <a:latin typeface="Unica One"/>
+              <a:ea typeface="Unica One"/>
+              <a:cs typeface="Unica One"/>
+              <a:sym typeface="Unica One"/>
+            </a:endParaRPr>
+          </a:p>
+        </p:txBody>
+      </p:sp>
+      <p:sp>
+        <p:nvSpPr>
+          <p:cNvPr id="226" name="Google Shape;226;p20"/>
           <p:cNvSpPr txBox="1">
             <a:spLocks noGrp="1"/>
           </p:cNvSpPr>
           <p:nvPr>
-            <p:ph type="subTitle" idx="1"/>
+            <p:ph type="subTitle" idx="4294967295"/>
           </p:nvPr>
         </p:nvSpPr>
         <p:spPr>
           <a:xfrm>
-            <a:off x="2381250" y="698750"/>
-            <a:ext cx="5116200" cy="1525500"/>
+            <a:off x="5691250" y="4171700"/>
+            <a:ext cx="2211900" cy="572400"/>
           </a:xfrm>
           <a:prstGeom prst="rect">
             <a:avLst/>
@@ -15775,122 +17713,98 @@
           </a:bodyPr>
           <a:lstStyle/>
           <a:p>
-            <a:pPr marL="0" lvl="0" indent="0" algn="l" rtl="0">
-              <a:spcBef>
-                <a:spcPts val="0"/>
-              </a:spcBef>
-              <a:spcAft>
-                <a:spcPts val="0"/>
-              </a:spcAft>
-              <a:buClr>
-                <a:schemeClr val="dk1"/>
-              </a:buClr>
-              <a:buSzPts val="1100"/>
-              <a:buFont typeface="Arial"/>
+            <a:pPr marL="0" lvl="0" indent="0" algn="just" rtl="0">
+              <a:lnSpc>
+                <a:spcPct val="100000"/>
+              </a:lnSpc>
+              <a:spcBef>
+                <a:spcPts val="0"/>
+              </a:spcBef>
+              <a:spcAft>
+                <a:spcPts val="0"/>
+              </a:spcAft>
               <a:buNone/>
             </a:pPr>
             <a:r>
-              <a:rPr lang="es"/>
-              <a:t>Se requieren de sensores instalados en los edificios altos, alcantarillas, avionetas,  ríos, tierra de cultivo y cualquier punto clave en la ciudad/campo para una medición adecuada. Para medir la contaminación en ámbitos distintos ambientales de la ciudad se requieren sensores de detección de:</a:t>
+              <a:rPr lang="es" sz="900">
+                <a:latin typeface="Lato"/>
+                <a:ea typeface="Lato"/>
+                <a:cs typeface="Lato"/>
+                <a:sym typeface="Lato"/>
+              </a:rPr>
+              <a:t>Basándose en inteligencia artificial, notifica las mejores horas para salir a hacer deporte, y evitar el aire más nocivo para la salud.</a:t>
             </a:r>
-            <a:endParaRPr/>
+            <a:endParaRPr sz="900">
+              <a:latin typeface="Lato"/>
+              <a:ea typeface="Lato"/>
+              <a:cs typeface="Lato"/>
+              <a:sym typeface="Lato"/>
+            </a:endParaRPr>
           </a:p>
           <a:p>
             <a:pPr marL="0" lvl="0" indent="0" algn="l" rtl="0">
-              <a:spcBef>
-                <a:spcPts val="0"/>
-              </a:spcBef>
-              <a:spcAft>
-                <a:spcPts val="0"/>
-              </a:spcAft>
-              <a:buClr>
-                <a:schemeClr val="dk1"/>
-              </a:buClr>
-              <a:buSzPts val="1100"/>
-              <a:buFont typeface="Arial"/>
+              <a:lnSpc>
+                <a:spcPct val="100000"/>
+              </a:lnSpc>
+              <a:spcBef>
+                <a:spcPts val="0"/>
+              </a:spcBef>
+              <a:spcAft>
+                <a:spcPts val="1600"/>
+              </a:spcAft>
               <a:buNone/>
             </a:pPr>
-            <a:endParaRPr/>
+            <a:endParaRPr sz="1000"/>
           </a:p>
+        </p:txBody>
+      </p:sp>
+      <p:sp>
+        <p:nvSpPr>
+          <p:cNvPr id="227" name="Google Shape;227;p20"/>
+          <p:cNvSpPr txBox="1">
+            <a:spLocks noGrp="1"/>
+          </p:cNvSpPr>
+          <p:nvPr>
+            <p:ph type="subTitle" idx="4294967295"/>
+          </p:nvPr>
+        </p:nvSpPr>
+        <p:spPr>
+          <a:xfrm>
+            <a:off x="1270750" y="1934125"/>
+            <a:ext cx="2525700" cy="572400"/>
+          </a:xfrm>
+          <a:prstGeom prst="rect">
+            <a:avLst/>
+          </a:prstGeom>
+        </p:spPr>
+        <p:txBody>
+          <a:bodyPr spcFirstLastPara="1" wrap="square" lIns="91425" tIns="91425" rIns="91425" bIns="91425" anchor="t" anchorCtr="0">
+            <a:noAutofit/>
+          </a:bodyPr>
+          <a:lstStyle/>
           <a:p>
-            <a:pPr marL="457200" lvl="0" indent="-304800" algn="l" rtl="0">
-              <a:spcBef>
-                <a:spcPts val="0"/>
-              </a:spcBef>
-              <a:spcAft>
-                <a:spcPts val="0"/>
-              </a:spcAft>
-              <a:buSzPts val="1200"/>
-              <a:buChar char="●"/>
+            <a:pPr marL="0" lvl="0" indent="0" algn="just" rtl="0">
+              <a:lnSpc>
+                <a:spcPct val="100000"/>
+              </a:lnSpc>
+              <a:spcBef>
+                <a:spcPts val="0"/>
+              </a:spcBef>
+              <a:spcAft>
+                <a:spcPts val="0"/>
+              </a:spcAft>
+              <a:buNone/>
             </a:pPr>
             <a:r>
-              <a:rPr lang="es"/>
-              <a:t>CO2, N2O, CH4, entre otros gases de efecto invernadero, para la contaminación atmosférica del aire.</a:t>
+              <a:rPr lang="es" sz="900">
+                <a:latin typeface="Lato"/>
+                <a:ea typeface="Lato"/>
+                <a:cs typeface="Lato"/>
+                <a:sym typeface="Lato"/>
+              </a:rPr>
+              <a:t>Página web que cuantifica la cantidad de contaminantes atmosféricos (O3, NO2, SO2), y marca los puntos contaminados en la región del mapa.</a:t>
             </a:r>
-            <a:endParaRPr/>
-          </a:p>
-          <a:p>
-            <a:pPr marL="457200" lvl="0" indent="-304800" algn="l" rtl="0">
-              <a:spcBef>
-                <a:spcPts val="0"/>
-              </a:spcBef>
-              <a:spcAft>
-                <a:spcPts val="0"/>
-              </a:spcAft>
-              <a:buSzPts val="1200"/>
-              <a:buChar char="●"/>
-            </a:pPr>
-            <a:r>
-              <a:rPr lang="es"/>
-              <a:t>Materia orgánica descompuesta (basura), microorganismos dañinos o ácidos fuertes para el agua.</a:t>
-            </a:r>
-            <a:endParaRPr/>
-          </a:p>
-          <a:p>
-            <a:pPr marL="457200" lvl="0" indent="-304800" algn="l" rtl="0">
-              <a:spcBef>
-                <a:spcPts val="0"/>
-              </a:spcBef>
-              <a:spcAft>
-                <a:spcPts val="0"/>
-              </a:spcAft>
-              <a:buSzPts val="1200"/>
-              <a:buChar char="●"/>
-            </a:pPr>
-            <a:r>
-              <a:rPr lang="es"/>
-              <a:t>N2, K, P2O5, y orgánicos tóxicos en la tierra de cultivo. </a:t>
-            </a:r>
-            <a:endParaRPr/>
-          </a:p>
-          <a:p>
-            <a:pPr marL="0" lvl="0" indent="0" algn="l" rtl="0">
-              <a:spcBef>
-                <a:spcPts val="0"/>
-              </a:spcBef>
-              <a:spcAft>
-                <a:spcPts val="0"/>
-              </a:spcAft>
-              <a:buClr>
-                <a:schemeClr val="dk1"/>
-              </a:buClr>
-              <a:buSzPts val="1100"/>
-              <a:buFont typeface="Arial"/>
-              <a:buNone/>
-            </a:pPr>
-            <a:endParaRPr/>
-          </a:p>
-          <a:p>
-            <a:pPr marL="0" lvl="0" indent="0" algn="l" rtl="0">
-              <a:spcBef>
-                <a:spcPts val="0"/>
-              </a:spcBef>
-              <a:spcAft>
-                <a:spcPts val="0"/>
-              </a:spcAft>
-              <a:buNone/>
-            </a:pPr>
-            <a:endParaRPr/>
+            <a:endParaRPr sz="900"/>
           </a:p>
         </p:txBody>
       </p:sp>

</xml_diff>